<commit_message>
minor change to pres
</commit_message>
<xml_diff>
--- a/Presentation.pptx
+++ b/Presentation.pptx
@@ -304,7 +304,7 @@
           <a:p>
             <a:fld id="{F28DFB7C-AA93-468F-9558-C5502021D876}" type="datetimeFigureOut">
               <a:rPr lang="en-US" smtClean="0"/>
-              <a:t>2/12/19</a:t>
+              <a:t>2/14/19</a:t>
             </a:fld>
             <a:endParaRPr lang="en-US"/>
           </a:p>
@@ -467,7 +467,7 @@
           <a:p>
             <a:fld id="{F28DFB7C-AA93-468F-9558-C5502021D876}" type="datetimeFigureOut">
               <a:rPr lang="en-US" smtClean="0"/>
-              <a:t>2/12/19</a:t>
+              <a:t>2/14/19</a:t>
             </a:fld>
             <a:endParaRPr lang="en-US"/>
           </a:p>
@@ -640,7 +640,7 @@
           <a:p>
             <a:fld id="{F28DFB7C-AA93-468F-9558-C5502021D876}" type="datetimeFigureOut">
               <a:rPr lang="en-US" smtClean="0"/>
-              <a:t>2/12/19</a:t>
+              <a:t>2/14/19</a:t>
             </a:fld>
             <a:endParaRPr lang="en-US"/>
           </a:p>
@@ -803,7 +803,7 @@
           <a:p>
             <a:fld id="{F28DFB7C-AA93-468F-9558-C5502021D876}" type="datetimeFigureOut">
               <a:rPr lang="en-US" smtClean="0"/>
-              <a:t>2/12/19</a:t>
+              <a:t>2/14/19</a:t>
             </a:fld>
             <a:endParaRPr lang="en-US"/>
           </a:p>
@@ -1043,7 +1043,7 @@
           <a:p>
             <a:fld id="{F28DFB7C-AA93-468F-9558-C5502021D876}" type="datetimeFigureOut">
               <a:rPr lang="en-US" smtClean="0"/>
-              <a:t>2/12/19</a:t>
+              <a:t>2/14/19</a:t>
             </a:fld>
             <a:endParaRPr lang="en-US"/>
           </a:p>
@@ -1323,7 +1323,7 @@
           <a:p>
             <a:fld id="{F28DFB7C-AA93-468F-9558-C5502021D876}" type="datetimeFigureOut">
               <a:rPr lang="en-US" smtClean="0"/>
-              <a:t>2/12/19</a:t>
+              <a:t>2/14/19</a:t>
             </a:fld>
             <a:endParaRPr lang="en-US"/>
           </a:p>
@@ -1737,7 +1737,7 @@
           <a:p>
             <a:fld id="{F28DFB7C-AA93-468F-9558-C5502021D876}" type="datetimeFigureOut">
               <a:rPr lang="en-US" smtClean="0"/>
-              <a:t>2/12/19</a:t>
+              <a:t>2/14/19</a:t>
             </a:fld>
             <a:endParaRPr lang="en-US"/>
           </a:p>
@@ -1849,7 +1849,7 @@
           <a:p>
             <a:fld id="{F28DFB7C-AA93-468F-9558-C5502021D876}" type="datetimeFigureOut">
               <a:rPr lang="en-US" smtClean="0"/>
-              <a:t>2/12/19</a:t>
+              <a:t>2/14/19</a:t>
             </a:fld>
             <a:endParaRPr lang="en-US"/>
           </a:p>
@@ -1939,7 +1939,7 @@
           <a:p>
             <a:fld id="{F28DFB7C-AA93-468F-9558-C5502021D876}" type="datetimeFigureOut">
               <a:rPr lang="en-US" smtClean="0"/>
-              <a:t>2/12/19</a:t>
+              <a:t>2/14/19</a:t>
             </a:fld>
             <a:endParaRPr lang="en-US"/>
           </a:p>
@@ -2209,7 +2209,7 @@
           <a:p>
             <a:fld id="{F28DFB7C-AA93-468F-9558-C5502021D876}" type="datetimeFigureOut">
               <a:rPr lang="en-US" smtClean="0"/>
-              <a:t>2/12/19</a:t>
+              <a:t>2/14/19</a:t>
             </a:fld>
             <a:endParaRPr lang="en-US"/>
           </a:p>
@@ -2459,7 +2459,7 @@
           <a:p>
             <a:fld id="{F28DFB7C-AA93-468F-9558-C5502021D876}" type="datetimeFigureOut">
               <a:rPr lang="en-US" smtClean="0"/>
-              <a:t>2/12/19</a:t>
+              <a:t>2/14/19</a:t>
             </a:fld>
             <a:endParaRPr lang="en-US"/>
           </a:p>
@@ -2676,7 +2676,7 @@
           <a:p>
             <a:fld id="{F28DFB7C-AA93-468F-9558-C5502021D876}" type="datetimeFigureOut">
               <a:rPr lang="en-US" smtClean="0"/>
-              <a:t>2/12/19</a:t>
+              <a:t>2/14/19</a:t>
             </a:fld>
             <a:endParaRPr lang="en-US"/>
           </a:p>
@@ -3386,7 +3386,7 @@
           <a:p>
             <a:r>
               <a:rPr lang="en-US" sz="2000" dirty="0"/>
-              <a:t>The team found data from the EPA, USDA, and XXXXX in various forms (CSV, JSON, </a:t>
+              <a:t>The team found data from the Environmental Protection Agency and the US Department of Agriculture in various forms (CSV, JSON, </a:t>
             </a:r>
             <a:r>
               <a:rPr lang="en-US" sz="2000" dirty="0" err="1"/>

</xml_diff>